<commit_message>
Scaffolding for module 3
</commit_message>
<xml_diff>
--- a/OctopusDeployFundamentals/Module2-Packaging/Slides/Module2Class1-BuiltInPackageFeed.pptx
+++ b/OctopusDeployFundamentals/Module2-Packaging/Slides/Module2Class1-BuiltInPackageFeed.pptx
@@ -775,6 +775,81 @@
           <a:bodyPr/>
           <a:lstStyle/>
           <a:p>
+            <a:pPr marL="158750" marR="0" lvl="0" indent="0" algn="l" defTabSz="914400" rtl="0" eaLnBrk="1" fontAlgn="auto" latinLnBrk="0" hangingPunct="1">
+              <a:lnSpc>
+                <a:spcPct val="100000"/>
+              </a:lnSpc>
+              <a:spcBef>
+                <a:spcPts val="0"/>
+              </a:spcBef>
+              <a:spcAft>
+                <a:spcPts val="0"/>
+              </a:spcAft>
+              <a:buClr>
+                <a:srgbClr val="000000"/>
+              </a:buClr>
+              <a:buSzPts val="1100"/>
+              <a:buFont typeface="Arial"/>
+              <a:buNone/>
+              <a:tabLst/>
+              <a:defRPr/>
+            </a:pPr>
+            <a:r>
+              <a:rPr lang="en-GB" b="0" dirty="0">
+                <a:solidFill>
+                  <a:srgbClr val="D4D4D4"/>
+                </a:solidFill>
+                <a:effectLst/>
+                <a:latin typeface="Consolas" panose="020B0609020204030204" pitchFamily="49" charset="0"/>
+              </a:rPr>
+              <a:t>Welcome to module 2, class 1 of this Octopus Deploy Fundamentals </a:t>
+            </a:r>
+            <a:r>
+              <a:rPr lang="en-GB" b="0" dirty="0" err="1">
+                <a:solidFill>
+                  <a:srgbClr val="D4D4D4"/>
+                </a:solidFill>
+                <a:effectLst/>
+                <a:latin typeface="Consolas" panose="020B0609020204030204" pitchFamily="49" charset="0"/>
+              </a:rPr>
+              <a:t>cource</a:t>
+            </a:r>
+            <a:r>
+              <a:rPr lang="en-GB" b="0" dirty="0">
+                <a:solidFill>
+                  <a:srgbClr val="D4D4D4"/>
+                </a:solidFill>
+                <a:effectLst/>
+                <a:latin typeface="Consolas" panose="020B0609020204030204" pitchFamily="49" charset="0"/>
+              </a:rPr>
+              <a:t>. In this class, you'll learn how to package and publish your code so that Octopus Deploy can deploy it to your infrastructure.</a:t>
+            </a:r>
+          </a:p>
+          <a:p>
+            <a:pPr marL="158750" indent="0">
+              <a:buNone/>
+            </a:pPr>
+            <a:endParaRPr lang="en-GB" dirty="0"/>
+          </a:p>
+          <a:p>
+            <a:pPr marL="158750" indent="0">
+              <a:buNone/>
+            </a:pPr>
+            <a:r>
+              <a:rPr lang="en-GB" b="0" dirty="0">
+                <a:solidFill>
+                  <a:srgbClr val="D4D4D4"/>
+                </a:solidFill>
+                <a:effectLst/>
+                <a:latin typeface="Consolas" panose="020B0609020204030204" pitchFamily="49" charset="0"/>
+              </a:rPr>
+              <a:t>We'll cover…</a:t>
+            </a:r>
+          </a:p>
+          <a:p>
+            <a:pPr marL="158750" indent="0">
+              <a:buNone/>
+            </a:pPr>
             <a:endParaRPr lang="en-GB" dirty="0"/>
           </a:p>
         </p:txBody>
@@ -878,6 +953,105 @@
             <a:pPr marL="158750" indent="0">
               <a:buNone/>
             </a:pPr>
+            <a:r>
+              <a:rPr lang="en-GB" b="0" dirty="0">
+                <a:solidFill>
+                  <a:srgbClr val="D4D4D4"/>
+                </a:solidFill>
+                <a:effectLst/>
+                <a:latin typeface="Consolas" panose="020B0609020204030204" pitchFamily="49" charset="0"/>
+              </a:rPr>
+              <a:t>We’ll cover…</a:t>
+            </a:r>
+          </a:p>
+          <a:p>
+            <a:pPr marL="158750" indent="0">
+              <a:buNone/>
+            </a:pPr>
+            <a:br>
+              <a:rPr lang="en-GB" b="0" dirty="0">
+                <a:solidFill>
+                  <a:srgbClr val="D4D4D4"/>
+                </a:solidFill>
+                <a:effectLst/>
+                <a:latin typeface="Consolas" panose="020B0609020204030204" pitchFamily="49" charset="0"/>
+              </a:rPr>
+            </a:br>
+            <a:r>
+              <a:rPr lang="en-GB" b="0" dirty="0">
+                <a:solidFill>
+                  <a:srgbClr val="6796E6"/>
+                </a:solidFill>
+                <a:effectLst/>
+                <a:latin typeface="Consolas" panose="020B0609020204030204" pitchFamily="49" charset="0"/>
+              </a:rPr>
+              <a:t>-</a:t>
+            </a:r>
+            <a:r>
+              <a:rPr lang="en-GB" b="0" dirty="0">
+                <a:solidFill>
+                  <a:srgbClr val="D4D4D4"/>
+                </a:solidFill>
+                <a:effectLst/>
+                <a:latin typeface="Consolas" panose="020B0609020204030204" pitchFamily="49" charset="0"/>
+              </a:rPr>
+              <a:t> Why Octopus needs packages, and the formats Octopus supports</a:t>
+            </a:r>
+          </a:p>
+          <a:p>
+            <a:pPr marL="158750" indent="0">
+              <a:buNone/>
+            </a:pPr>
+            <a:r>
+              <a:rPr lang="en-GB" b="0" dirty="0">
+                <a:solidFill>
+                  <a:srgbClr val="6796E6"/>
+                </a:solidFill>
+                <a:effectLst/>
+                <a:latin typeface="Consolas" panose="020B0609020204030204" pitchFamily="49" charset="0"/>
+              </a:rPr>
+              <a:t>-</a:t>
+            </a:r>
+            <a:r>
+              <a:rPr lang="en-GB" b="0" dirty="0">
+                <a:solidFill>
+                  <a:srgbClr val="D4D4D4"/>
+                </a:solidFill>
+                <a:effectLst/>
+                <a:latin typeface="Consolas" panose="020B0609020204030204" pitchFamily="49" charset="0"/>
+              </a:rPr>
+              <a:t> Your options for hosting packages</a:t>
+            </a:r>
+          </a:p>
+          <a:p>
+            <a:pPr marL="158750" indent="0">
+              <a:buNone/>
+            </a:pPr>
+            <a:r>
+              <a:rPr lang="en-GB" b="0" dirty="0">
+                <a:solidFill>
+                  <a:srgbClr val="6796E6"/>
+                </a:solidFill>
+                <a:effectLst/>
+                <a:latin typeface="Consolas" panose="020B0609020204030204" pitchFamily="49" charset="0"/>
+              </a:rPr>
+              <a:t>-</a:t>
+            </a:r>
+            <a:r>
+              <a:rPr lang="en-GB" b="0" dirty="0">
+                <a:solidFill>
+                  <a:srgbClr val="D4D4D4"/>
+                </a:solidFill>
+                <a:effectLst/>
+                <a:latin typeface="Consolas" panose="020B0609020204030204" pitchFamily="49" charset="0"/>
+              </a:rPr>
+              <a:t> How to upload a package to the built-in package feed</a:t>
+            </a:r>
+          </a:p>
+          <a:p>
+            <a:pPr marL="158750" indent="0">
+              <a:buNone/>
+            </a:pPr>
             <a:endParaRPr lang="en-GB" b="0" dirty="0">
               <a:solidFill>
                 <a:srgbClr val="D4D4D4"/>
@@ -885,6 +1059,21 @@
               <a:effectLst/>
               <a:latin typeface="Consolas" panose="020B0609020204030204" pitchFamily="49" charset="0"/>
             </a:endParaRPr>
+          </a:p>
+          <a:p>
+            <a:pPr marL="158750" indent="0">
+              <a:buNone/>
+            </a:pPr>
+            <a:r>
+              <a:rPr lang="en-GB" b="0" dirty="0">
+                <a:solidFill>
+                  <a:srgbClr val="D4D4D4"/>
+                </a:solidFill>
+                <a:effectLst/>
+                <a:latin typeface="Consolas" panose="020B0609020204030204" pitchFamily="49" charset="0"/>
+              </a:rPr>
+              <a:t>To deploy with Octopus…</a:t>
+            </a:r>
           </a:p>
         </p:txBody>
       </p:sp>
@@ -984,6 +1173,272 @@
           </a:bodyPr>
           <a:lstStyle/>
           <a:p>
+            <a:pPr marL="158750" indent="0">
+              <a:buNone/>
+            </a:pPr>
+            <a:r>
+              <a:rPr lang="en-GB" b="0" dirty="0">
+                <a:solidFill>
+                  <a:srgbClr val="D4D4D4"/>
+                </a:solidFill>
+                <a:effectLst/>
+                <a:latin typeface="Consolas" panose="020B0609020204030204" pitchFamily="49" charset="0"/>
+              </a:rPr>
+              <a:t>To deploy with Octopus…</a:t>
+            </a:r>
+          </a:p>
+          <a:p>
+            <a:pPr marL="158750" indent="0">
+              <a:buNone/>
+            </a:pPr>
+            <a:endParaRPr lang="en-GB" b="0" dirty="0">
+              <a:solidFill>
+                <a:srgbClr val="D4D4D4"/>
+              </a:solidFill>
+              <a:effectLst/>
+              <a:latin typeface="Consolas" panose="020B0609020204030204" pitchFamily="49" charset="0"/>
+            </a:endParaRPr>
+          </a:p>
+          <a:p>
+            <a:pPr marL="158750" indent="0">
+              <a:buNone/>
+            </a:pPr>
+            <a:r>
+              <a:rPr lang="en-GB" b="0" dirty="0">
+                <a:solidFill>
+                  <a:srgbClr val="D4D4D4"/>
+                </a:solidFill>
+                <a:effectLst/>
+                <a:latin typeface="Consolas" panose="020B0609020204030204" pitchFamily="49" charset="0"/>
+              </a:rPr>
+              <a:t>…you first need to package any deployment artifacts required for deployment into a format that Octopus can consume. </a:t>
+            </a:r>
+          </a:p>
+          <a:p>
+            <a:pPr marL="158750" indent="0">
+              <a:buNone/>
+            </a:pPr>
+            <a:r>
+              <a:rPr lang="en-GB" b="0" dirty="0">
+                <a:solidFill>
+                  <a:srgbClr val="D4D4D4"/>
+                </a:solidFill>
+                <a:effectLst/>
+                <a:latin typeface="Consolas" panose="020B0609020204030204" pitchFamily="49" charset="0"/>
+              </a:rPr>
+              <a:t>CLICK (package)</a:t>
+            </a:r>
+          </a:p>
+          <a:p>
+            <a:pPr marL="158750" indent="0">
+              <a:buNone/>
+            </a:pPr>
+            <a:r>
+              <a:rPr lang="en-GB" b="0" dirty="0">
+                <a:solidFill>
+                  <a:srgbClr val="D4D4D4"/>
+                </a:solidFill>
+                <a:effectLst/>
+                <a:latin typeface="Consolas" panose="020B0609020204030204" pitchFamily="49" charset="0"/>
+              </a:rPr>
+              <a:t>Most often this means zipping up all the necessary files.</a:t>
+            </a:r>
+          </a:p>
+          <a:p>
+            <a:pPr marL="158750" indent="0">
+              <a:buNone/>
+            </a:pPr>
+            <a:r>
+              <a:rPr lang="en-GB" b="0" dirty="0">
+                <a:solidFill>
+                  <a:srgbClr val="D4D4D4"/>
+                </a:solidFill>
+                <a:effectLst/>
+                <a:latin typeface="Consolas" panose="020B0609020204030204" pitchFamily="49" charset="0"/>
+              </a:rPr>
+              <a:t>CLICK (.zip)</a:t>
+            </a:r>
+          </a:p>
+          <a:p>
+            <a:pPr marL="158750" indent="0">
+              <a:buNone/>
+            </a:pPr>
+            <a:r>
+              <a:rPr lang="en-GB" b="0" dirty="0">
+                <a:solidFill>
+                  <a:srgbClr val="D4D4D4"/>
+                </a:solidFill>
+                <a:effectLst/>
+                <a:latin typeface="Consolas" panose="020B0609020204030204" pitchFamily="49" charset="0"/>
+              </a:rPr>
+              <a:t>However, depending on what you are building, you might prefer to use a different file format</a:t>
+            </a:r>
+          </a:p>
+          <a:p>
+            <a:pPr marL="158750" indent="0">
+              <a:buNone/>
+            </a:pPr>
+            <a:r>
+              <a:rPr lang="en-GB" b="0" dirty="0">
+                <a:solidFill>
+                  <a:srgbClr val="D4D4D4"/>
+                </a:solidFill>
+                <a:effectLst/>
+                <a:latin typeface="Consolas" panose="020B0609020204030204" pitchFamily="49" charset="0"/>
+              </a:rPr>
+              <a:t>CLICK (.</a:t>
+            </a:r>
+            <a:r>
+              <a:rPr lang="en-GB" b="0" dirty="0" err="1">
+                <a:solidFill>
+                  <a:srgbClr val="D4D4D4"/>
+                </a:solidFill>
+                <a:effectLst/>
+                <a:latin typeface="Consolas" panose="020B0609020204030204" pitchFamily="49" charset="0"/>
+              </a:rPr>
+              <a:t>nupkg</a:t>
+            </a:r>
+            <a:r>
+              <a:rPr lang="en-GB" b="0" dirty="0">
+                <a:solidFill>
+                  <a:srgbClr val="D4D4D4"/>
+                </a:solidFill>
+                <a:effectLst/>
+                <a:latin typeface="Consolas" panose="020B0609020204030204" pitchFamily="49" charset="0"/>
+              </a:rPr>
+              <a:t>, .tar, .jar)</a:t>
+            </a:r>
+          </a:p>
+          <a:p>
+            <a:pPr marL="158750" indent="0">
+              <a:buNone/>
+            </a:pPr>
+            <a:r>
+              <a:rPr lang="en-GB" b="0" dirty="0">
+                <a:solidFill>
+                  <a:srgbClr val="D4D4D4"/>
+                </a:solidFill>
+                <a:effectLst/>
+                <a:latin typeface="Consolas" panose="020B0609020204030204" pitchFamily="49" charset="0"/>
+              </a:rPr>
+              <a:t>such as NuGet, JAR or Tar, or even </a:t>
+            </a:r>
+          </a:p>
+          <a:p>
+            <a:pPr marL="158750" indent="0">
+              <a:buNone/>
+            </a:pPr>
+            <a:r>
+              <a:rPr lang="en-GB" b="0" dirty="0">
+                <a:solidFill>
+                  <a:srgbClr val="D4D4D4"/>
+                </a:solidFill>
+                <a:effectLst/>
+                <a:latin typeface="Consolas" panose="020B0609020204030204" pitchFamily="49" charset="0"/>
+              </a:rPr>
+              <a:t>CLICK (docker)</a:t>
+            </a:r>
+          </a:p>
+          <a:p>
+            <a:pPr marL="158750" indent="0">
+              <a:buNone/>
+            </a:pPr>
+            <a:r>
+              <a:rPr lang="en-GB" b="0" dirty="0">
+                <a:solidFill>
+                  <a:srgbClr val="D4D4D4"/>
+                </a:solidFill>
+                <a:effectLst/>
+                <a:latin typeface="Consolas" panose="020B0609020204030204" pitchFamily="49" charset="0"/>
+              </a:rPr>
+              <a:t>Docker images. A full list of supported formats can be found in the additional resources associated with this module.</a:t>
+            </a:r>
+          </a:p>
+          <a:p>
+            <a:pPr marL="158750" indent="0">
+              <a:buNone/>
+            </a:pPr>
+            <a:r>
+              <a:rPr lang="en-GB" b="0" dirty="0">
+                <a:solidFill>
+                  <a:srgbClr val="D4D4D4"/>
+                </a:solidFill>
+                <a:effectLst/>
+                <a:latin typeface="Consolas" panose="020B0609020204030204" pitchFamily="49" charset="0"/>
+              </a:rPr>
+              <a:t>CLICK (</a:t>
+            </a:r>
+            <a:r>
+              <a:rPr lang="en-GB" b="0" dirty="0" err="1">
+                <a:solidFill>
+                  <a:srgbClr val="D4D4D4"/>
+                </a:solidFill>
+                <a:effectLst/>
+                <a:latin typeface="Consolas" panose="020B0609020204030204" pitchFamily="49" charset="0"/>
+              </a:rPr>
+              <a:t>ocotpus</a:t>
+            </a:r>
+            <a:r>
+              <a:rPr lang="en-GB" b="0" dirty="0">
+                <a:solidFill>
+                  <a:srgbClr val="D4D4D4"/>
+                </a:solidFill>
+                <a:effectLst/>
+                <a:latin typeface="Consolas" panose="020B0609020204030204" pitchFamily="49" charset="0"/>
+              </a:rPr>
+              <a:t>)</a:t>
+            </a:r>
+            <a:br>
+              <a:rPr lang="en-GB" b="0" dirty="0">
+                <a:solidFill>
+                  <a:srgbClr val="D4D4D4"/>
+                </a:solidFill>
+                <a:effectLst/>
+                <a:latin typeface="Consolas" panose="020B0609020204030204" pitchFamily="49" charset="0"/>
+              </a:rPr>
+            </a:br>
+            <a:r>
+              <a:rPr lang="en-GB" b="0" dirty="0">
+                <a:solidFill>
+                  <a:srgbClr val="D4D4D4"/>
+                </a:solidFill>
+                <a:effectLst/>
+                <a:latin typeface="Consolas" panose="020B0609020204030204" pitchFamily="49" charset="0"/>
+              </a:rPr>
+              <a:t>Once Octopus has the packages, it can…</a:t>
+            </a:r>
+          </a:p>
+          <a:p>
+            <a:pPr marL="158750" indent="0">
+              <a:buNone/>
+            </a:pPr>
+            <a:r>
+              <a:rPr lang="en-GB" b="0" dirty="0">
+                <a:solidFill>
+                  <a:srgbClr val="D4D4D4"/>
+                </a:solidFill>
+                <a:effectLst/>
+                <a:latin typeface="Consolas" panose="020B0609020204030204" pitchFamily="49" charset="0"/>
+              </a:rPr>
+              <a:t>CLICK (deploys)</a:t>
+            </a:r>
+          </a:p>
+          <a:p>
+            <a:pPr marL="158750" indent="0">
+              <a:buNone/>
+            </a:pPr>
+            <a:r>
+              <a:rPr lang="en-GB" b="0" dirty="0">
+                <a:solidFill>
+                  <a:srgbClr val="D4D4D4"/>
+                </a:solidFill>
+                <a:effectLst/>
+                <a:latin typeface="Consolas" panose="020B0609020204030204" pitchFamily="49" charset="0"/>
+              </a:rPr>
+              <a:t>…copy them to Deployment Targets, and run any scripts required to set things up.</a:t>
+            </a:r>
+          </a:p>
+          <a:p>
             <a:pPr marL="0" lvl="0" indent="0" algn="l" rtl="0">
               <a:spcBef>
                 <a:spcPts val="0"/>
@@ -1087,6 +1542,253 @@
             <a:noAutofit/>
           </a:bodyPr>
           <a:lstStyle/>
+          <a:p>
+            <a:pPr marL="158750" indent="0">
+              <a:buNone/>
+            </a:pPr>
+            <a:r>
+              <a:rPr lang="en-GB" b="0" dirty="0">
+                <a:solidFill>
+                  <a:srgbClr val="D4D4D4"/>
+                </a:solidFill>
+                <a:effectLst/>
+                <a:latin typeface="Consolas" panose="020B0609020204030204" pitchFamily="49" charset="0"/>
+              </a:rPr>
+              <a:t>Octopus comes with a built-in package repository. You can navigate to the built-in repository in the Octopus Deploy web portal by navigating to Library, and then Packages. For most users, the easiest way to get started is to upload their files directly in the browser. You can do this by clicking UPLOAD PACKAGE and drag/dropping your packages like this.</a:t>
+            </a:r>
+          </a:p>
+          <a:p>
+            <a:pPr marL="158750" indent="0">
+              <a:buNone/>
+            </a:pPr>
+            <a:r>
+              <a:rPr lang="en-GB" b="0" dirty="0">
+                <a:solidFill>
+                  <a:srgbClr val="D4D4D4"/>
+                </a:solidFill>
+                <a:effectLst/>
+                <a:latin typeface="Consolas" panose="020B0609020204030204" pitchFamily="49" charset="0"/>
+              </a:rPr>
+              <a:t>DRAG/DROP PACKAGE</a:t>
+            </a:r>
+          </a:p>
+          <a:p>
+            <a:pPr marL="158750" indent="0">
+              <a:buNone/>
+            </a:pPr>
+            <a:r>
+              <a:rPr lang="en-GB" b="0" dirty="0">
+                <a:solidFill>
+                  <a:srgbClr val="D4D4D4"/>
+                </a:solidFill>
+                <a:effectLst/>
+                <a:latin typeface="Consolas" panose="020B0609020204030204" pitchFamily="49" charset="0"/>
+              </a:rPr>
+              <a:t>Note the zip file naming convention that tells Octopus the version number of this package. We recommend adopting a consistent versioning convention, such as major version dot minor version dot build number.</a:t>
+            </a:r>
+          </a:p>
+          <a:p>
+            <a:pPr marL="158750" indent="0">
+              <a:buNone/>
+            </a:pPr>
+            <a:r>
+              <a:rPr lang="en-GB" b="0" dirty="0">
+                <a:solidFill>
+                  <a:srgbClr val="D4D4D4"/>
+                </a:solidFill>
+                <a:effectLst/>
+                <a:latin typeface="Consolas" panose="020B0609020204030204" pitchFamily="49" charset="0"/>
+              </a:rPr>
+              <a:t>HIGHLIGHT BUILD NUMBER / UPLOAD</a:t>
+            </a:r>
+            <a:br>
+              <a:rPr lang="en-GB" b="0" dirty="0">
+                <a:solidFill>
+                  <a:srgbClr val="D4D4D4"/>
+                </a:solidFill>
+                <a:effectLst/>
+                <a:latin typeface="Consolas" panose="020B0609020204030204" pitchFamily="49" charset="0"/>
+              </a:rPr>
+            </a:br>
+            <a:r>
+              <a:rPr lang="en-GB" b="0" dirty="0">
+                <a:solidFill>
+                  <a:srgbClr val="D4D4D4"/>
+                </a:solidFill>
+                <a:effectLst/>
+                <a:latin typeface="Consolas" panose="020B0609020204030204" pitchFamily="49" charset="0"/>
+              </a:rPr>
+              <a:t>I created this package by cloning the </a:t>
+            </a:r>
+            <a:r>
+              <a:rPr lang="en-GB" b="0" dirty="0" err="1">
+                <a:solidFill>
+                  <a:srgbClr val="D4D4D4"/>
+                </a:solidFill>
+                <a:effectLst/>
+                <a:latin typeface="Consolas" panose="020B0609020204030204" pitchFamily="49" charset="0"/>
+              </a:rPr>
+              <a:t>RandomQuotes</a:t>
+            </a:r>
+            <a:r>
+              <a:rPr lang="en-GB" b="0" dirty="0">
+                <a:solidFill>
+                  <a:srgbClr val="D4D4D4"/>
+                </a:solidFill>
+                <a:effectLst/>
+                <a:latin typeface="Consolas" panose="020B0609020204030204" pitchFamily="49" charset="0"/>
+              </a:rPr>
+              <a:t> GitHub repository from Octopus Samples, compiling the asp.net core project, and zipping up the build output. However, Octopus provides more information in the help sidebar.</a:t>
+            </a:r>
+          </a:p>
+          <a:p>
+            <a:pPr marL="158750" indent="0">
+              <a:buNone/>
+            </a:pPr>
+            <a:r>
+              <a:rPr lang="en-GB" b="0" dirty="0">
+                <a:solidFill>
+                  <a:srgbClr val="D4D4D4"/>
+                </a:solidFill>
+                <a:effectLst/>
+                <a:latin typeface="Consolas" panose="020B0609020204030204" pitchFamily="49" charset="0"/>
+              </a:rPr>
+              <a:t>USE PACKAGE GUIDE</a:t>
+            </a:r>
+            <a:br>
+              <a:rPr lang="en-GB" b="0" dirty="0">
+                <a:solidFill>
+                  <a:srgbClr val="D4D4D4"/>
+                </a:solidFill>
+                <a:effectLst/>
+                <a:latin typeface="Consolas" panose="020B0609020204030204" pitchFamily="49" charset="0"/>
+              </a:rPr>
+            </a:br>
+            <a:r>
+              <a:rPr lang="en-GB" b="0" dirty="0">
+                <a:solidFill>
+                  <a:srgbClr val="D4D4D4"/>
+                </a:solidFill>
+                <a:effectLst/>
+                <a:latin typeface="Consolas" panose="020B0609020204030204" pitchFamily="49" charset="0"/>
+              </a:rPr>
+              <a:t>While uploading packages manually is handy for a quick proof of concept, for most real-world implementations of Octopus Deploy, it's recommended to automate the packaging and publishing process. The help side-bar provides various methods for automating this process.</a:t>
+            </a:r>
+          </a:p>
+          <a:p>
+            <a:pPr marL="158750" indent="0">
+              <a:buNone/>
+            </a:pPr>
+            <a:r>
+              <a:rPr lang="en-GB" b="0" dirty="0">
+                <a:solidFill>
+                  <a:srgbClr val="D4D4D4"/>
+                </a:solidFill>
+                <a:effectLst/>
+                <a:latin typeface="Consolas" panose="020B0609020204030204" pitchFamily="49" charset="0"/>
+              </a:rPr>
+              <a:t>VIEW EXAMPLES OF PUSHING PACKAGES</a:t>
+            </a:r>
+          </a:p>
+          <a:p>
+            <a:pPr marL="158750" indent="0">
+              <a:buNone/>
+            </a:pPr>
+            <a:r>
+              <a:rPr lang="en-GB" b="0" dirty="0">
+                <a:solidFill>
+                  <a:srgbClr val="D4D4D4"/>
+                </a:solidFill>
+                <a:effectLst/>
+                <a:latin typeface="Consolas" panose="020B0609020204030204" pitchFamily="49" charset="0"/>
+              </a:rPr>
+              <a:t>Most users automate this using build servers, such as TeamCity, Jenkins, Azure DevOps or GitHub Actions. Code updates are automatically compiled and tested. Then, assuming all the tests pass, the build artifacts are automatically packaged and published to Octopus for deployment.</a:t>
+            </a:r>
+          </a:p>
+          <a:p>
+            <a:pPr marL="158750" indent="0">
+              <a:buNone/>
+            </a:pPr>
+            <a:br>
+              <a:rPr lang="en-GB" b="0" dirty="0">
+                <a:solidFill>
+                  <a:srgbClr val="D4D4D4"/>
+                </a:solidFill>
+                <a:effectLst/>
+                <a:latin typeface="Consolas" panose="020B0609020204030204" pitchFamily="49" charset="0"/>
+              </a:rPr>
+            </a:br>
+            <a:r>
+              <a:rPr lang="en-GB" b="0" dirty="0">
+                <a:solidFill>
+                  <a:srgbClr val="D4D4D4"/>
+                </a:solidFill>
+                <a:effectLst/>
+                <a:latin typeface="Consolas" panose="020B0609020204030204" pitchFamily="49" charset="0"/>
+              </a:rPr>
+              <a:t>While the built-in package feed meets the needs of most users, </a:t>
+            </a:r>
+          </a:p>
+          <a:p>
+            <a:pPr marL="158750" indent="0">
+              <a:buNone/>
+            </a:pPr>
+            <a:r>
+              <a:rPr lang="en-GB" b="0" dirty="0">
+                <a:solidFill>
+                  <a:srgbClr val="D4D4D4"/>
+                </a:solidFill>
+                <a:effectLst/>
+                <a:latin typeface="Consolas" panose="020B0609020204030204" pitchFamily="49" charset="0"/>
+              </a:rPr>
+              <a:t>OPEN BUILTIN FEED</a:t>
+            </a:r>
+          </a:p>
+          <a:p>
+            <a:pPr marL="158750" indent="0">
+              <a:buNone/>
+            </a:pPr>
+            <a:r>
+              <a:rPr lang="en-GB" b="0" dirty="0">
+                <a:solidFill>
+                  <a:srgbClr val="D4D4D4"/>
+                </a:solidFill>
+                <a:effectLst/>
+                <a:latin typeface="Consolas" panose="020B0609020204030204" pitchFamily="49" charset="0"/>
+              </a:rPr>
+              <a:t>Octopus also supports various types of external feeds. </a:t>
+            </a:r>
+          </a:p>
+          <a:p>
+            <a:pPr marL="158750" indent="0">
+              <a:buNone/>
+            </a:pPr>
+            <a:r>
+              <a:rPr lang="en-GB" b="0" dirty="0">
+                <a:solidFill>
+                  <a:srgbClr val="D4D4D4"/>
+                </a:solidFill>
+                <a:effectLst/>
+                <a:latin typeface="Consolas" panose="020B0609020204030204" pitchFamily="49" charset="0"/>
+              </a:rPr>
+              <a:t>EXTERNAL FEEDS</a:t>
+            </a:r>
+          </a:p>
+          <a:p>
+            <a:pPr marL="158750" indent="0">
+              <a:buNone/>
+            </a:pPr>
+            <a:r>
+              <a:rPr lang="en-GB" b="0" dirty="0">
+                <a:solidFill>
+                  <a:srgbClr val="D4D4D4"/>
+                </a:solidFill>
+                <a:effectLst/>
+                <a:latin typeface="Consolas" panose="020B0609020204030204" pitchFamily="49" charset="0"/>
+              </a:rPr>
+              <a:t>For example, if users already use some other package feed, or if they prefer to set up a separate package manager, they can integrate their own package feed with Octopus Deploy. For more information about external package feeds, check out the additional resources associated with this module.</a:t>
+            </a:r>
+          </a:p>
           <a:p>
             <a:pPr marL="0" lvl="0" indent="0" algn="l" rtl="0">
               <a:spcBef>
@@ -1196,6 +1898,149 @@
             <a:noAutofit/>
           </a:bodyPr>
           <a:lstStyle/>
+          <a:p>
+            <a:pPr marL="158750" indent="0">
+              <a:buNone/>
+            </a:pPr>
+            <a:r>
+              <a:rPr lang="en-GB" b="0" dirty="0">
+                <a:solidFill>
+                  <a:srgbClr val="D4D4D4"/>
+                </a:solidFill>
+                <a:effectLst/>
+                <a:latin typeface="Consolas" panose="020B0609020204030204" pitchFamily="49" charset="0"/>
+              </a:rPr>
+              <a:t>Remember:</a:t>
+            </a:r>
+          </a:p>
+          <a:p>
+            <a:pPr marL="158750" indent="0">
+              <a:buNone/>
+            </a:pPr>
+            <a:br>
+              <a:rPr lang="en-GB" b="0" dirty="0">
+                <a:solidFill>
+                  <a:srgbClr val="D4D4D4"/>
+                </a:solidFill>
+                <a:effectLst/>
+                <a:latin typeface="Consolas" panose="020B0609020204030204" pitchFamily="49" charset="0"/>
+              </a:rPr>
+            </a:br>
+            <a:r>
+              <a:rPr lang="en-GB" b="0" dirty="0">
+                <a:solidFill>
+                  <a:srgbClr val="6796E6"/>
+                </a:solidFill>
+                <a:effectLst/>
+                <a:latin typeface="Consolas" panose="020B0609020204030204" pitchFamily="49" charset="0"/>
+              </a:rPr>
+              <a:t>-</a:t>
+            </a:r>
+            <a:r>
+              <a:rPr lang="en-GB" b="0" dirty="0">
+                <a:solidFill>
+                  <a:srgbClr val="D4D4D4"/>
+                </a:solidFill>
+                <a:effectLst/>
+                <a:latin typeface="Consolas" panose="020B0609020204030204" pitchFamily="49" charset="0"/>
+              </a:rPr>
+              <a:t> If you don't already have one, start with the built-in package feed</a:t>
+            </a:r>
+          </a:p>
+          <a:p>
+            <a:pPr marL="158750" indent="0">
+              <a:buNone/>
+            </a:pPr>
+            <a:r>
+              <a:rPr lang="en-GB" b="0" dirty="0">
+                <a:solidFill>
+                  <a:srgbClr val="6796E6"/>
+                </a:solidFill>
+                <a:effectLst/>
+                <a:latin typeface="Consolas" panose="020B0609020204030204" pitchFamily="49" charset="0"/>
+              </a:rPr>
+              <a:t>-</a:t>
+            </a:r>
+            <a:r>
+              <a:rPr lang="en-GB" b="0" dirty="0">
+                <a:solidFill>
+                  <a:srgbClr val="D4D4D4"/>
+                </a:solidFill>
+                <a:effectLst/>
+                <a:latin typeface="Consolas" panose="020B0609020204030204" pitchFamily="49" charset="0"/>
+              </a:rPr>
+              <a:t> Adopt a consistent semantic versioning strategy to help you keep track of the different versions of your code</a:t>
+            </a:r>
+          </a:p>
+          <a:p>
+            <a:pPr marL="158750" indent="0">
+              <a:buNone/>
+            </a:pPr>
+            <a:r>
+              <a:rPr lang="en-GB" b="0" dirty="0">
+                <a:solidFill>
+                  <a:srgbClr val="6796E6"/>
+                </a:solidFill>
+                <a:effectLst/>
+                <a:latin typeface="Consolas" panose="020B0609020204030204" pitchFamily="49" charset="0"/>
+              </a:rPr>
+              <a:t>-</a:t>
+            </a:r>
+            <a:r>
+              <a:rPr lang="en-GB" b="0" dirty="0">
+                <a:solidFill>
+                  <a:srgbClr val="D4D4D4"/>
+                </a:solidFill>
+                <a:effectLst/>
+                <a:latin typeface="Consolas" panose="020B0609020204030204" pitchFamily="49" charset="0"/>
+              </a:rPr>
+              <a:t> </a:t>
+            </a:r>
+            <a:r>
+              <a:rPr lang="en-GB" b="0">
+                <a:solidFill>
+                  <a:srgbClr val="D4D4D4"/>
+                </a:solidFill>
+                <a:effectLst/>
+                <a:latin typeface="Consolas" panose="020B0609020204030204" pitchFamily="49" charset="0"/>
+              </a:rPr>
+              <a:t>Automate the packaging </a:t>
+            </a:r>
+            <a:r>
+              <a:rPr lang="en-GB" b="0" dirty="0">
+                <a:solidFill>
+                  <a:srgbClr val="D4D4D4"/>
+                </a:solidFill>
+                <a:effectLst/>
+                <a:latin typeface="Consolas" panose="020B0609020204030204" pitchFamily="49" charset="0"/>
+              </a:rPr>
+              <a:t>and publishing process using a build server</a:t>
+            </a:r>
+          </a:p>
+          <a:p>
+            <a:pPr marL="158750" indent="0">
+              <a:buNone/>
+            </a:pPr>
+            <a:br>
+              <a:rPr lang="en-GB" b="0" dirty="0">
+                <a:solidFill>
+                  <a:srgbClr val="D4D4D4"/>
+                </a:solidFill>
+                <a:effectLst/>
+                <a:latin typeface="Consolas" panose="020B0609020204030204" pitchFamily="49" charset="0"/>
+              </a:rPr>
+            </a:br>
+            <a:r>
+              <a:rPr lang="en-GB" b="0" dirty="0">
+                <a:solidFill>
+                  <a:srgbClr val="D4D4D4"/>
+                </a:solidFill>
+                <a:effectLst/>
+                <a:latin typeface="Consolas" panose="020B0609020204030204" pitchFamily="49" charset="0"/>
+              </a:rPr>
+              <a:t>Thanks for watching, and happy deployments.</a:t>
+            </a:r>
+          </a:p>
           <a:p>
             <a:pPr marL="158750" indent="0">
               <a:buNone/>
@@ -8888,7 +9733,7 @@
             </a:pPr>
             <a:r>
               <a:rPr lang="en-GB" sz="2400" dirty="0"/>
-              <a:t>Start with the built-in package repo</a:t>
+              <a:t>Start with the built-in package feed</a:t>
             </a:r>
             <a:br>
               <a:rPr lang="en-GB" sz="2400" dirty="0"/>

</xml_diff>